<commit_message>
Slides modules 8-9 and Source Code modules 4-6
</commit_message>
<xml_diff>
--- a/Setup and Installation/Setup and Installation.pptx
+++ b/Setup and Installation/Setup and Installation.pptx
@@ -5763,7 +5763,7 @@
           </p:nvPr>
         </p:nvGraphicFramePr>
         <p:xfrm>
-          <a:off x="3752215" y="2324735"/>
+          <a:off x="3752850" y="2324735"/>
           <a:ext cx="4686300" cy="3352800"/>
         </p:xfrm>
         <a:graphic>
@@ -5791,7 +5791,7 @@
                     </p:blipFill>
                     <p:spPr>
                       <a:xfrm>
-                        <a:off x="3752215" y="2324735"/>
+                        <a:off x="3752850" y="2324735"/>
                         <a:ext cx="4686300" cy="3352800"/>
                       </a:xfrm>
                       <a:prstGeom prst="rect">

</xml_diff>